<commit_message>
Deleted some pictures from Project 2. Project 2 commits
</commit_message>
<xml_diff>
--- a/Project 2/Project2-World Happiness.pptx
+++ b/Project 2/Project2-World Happiness.pptx
@@ -18579,13 +18579,13 @@
           <p:nvPr>
             <p:extLst>
               <p:ext uri="{D42A27DB-BD31-4B8C-83A1-F6EECF244321}">
-                <p14:modId xmlns:p14="http://schemas.microsoft.com/office/powerpoint/2010/main" val="4257139101"/>
+                <p14:modId xmlns:p14="http://schemas.microsoft.com/office/powerpoint/2010/main" val="976124878"/>
               </p:ext>
             </p:extLst>
           </p:nvPr>
         </p:nvGraphicFramePr>
         <p:xfrm>
-          <a:off x="1782486" y="2944080"/>
+          <a:off x="1801942" y="2930708"/>
           <a:ext cx="1802498" cy="1325062"/>
         </p:xfrm>
         <a:graphic>

</xml_diff>